<commit_message>
change confidence rating response keys (from left/down/right to 1/2/3)
</commit_message>
<xml_diff>
--- a/Instructions/instructions.pptx
+++ b/Instructions/instructions.pptx
@@ -105,6 +105,11 @@
       </a:defRPr>
     </a:lvl9pPr>
   </p:defaultTextStyle>
+  <p:extLst>
+    <p:ext uri="{EFAFB233-063F-42B5-8137-9DF3F51BA10A}">
+      <p15:sldGuideLst xmlns:p15="http://schemas.microsoft.com/office/powerpoint/2012/main"/>
+    </p:ext>
+  </p:extLst>
 </p:presentation>
 </file>
 
@@ -255,7 +260,7 @@
           <a:p>
             <a:fld id="{FD53FD50-5C23-F345-9B3E-009D52889CFA}" type="datetimeFigureOut">
               <a:rPr kumimoji="1" lang="zh-CN" altLang="en-US" smtClean="0"/>
-              <a:t>2025/10/21</a:t>
+              <a:t>2025/10/22</a:t>
             </a:fld>
             <a:endParaRPr kumimoji="1" lang="zh-CN" altLang="en-US"/>
           </a:p>
@@ -453,7 +458,7 @@
           <a:p>
             <a:fld id="{FD53FD50-5C23-F345-9B3E-009D52889CFA}" type="datetimeFigureOut">
               <a:rPr kumimoji="1" lang="zh-CN" altLang="en-US" smtClean="0"/>
-              <a:t>2025/10/21</a:t>
+              <a:t>2025/10/22</a:t>
             </a:fld>
             <a:endParaRPr kumimoji="1" lang="zh-CN" altLang="en-US"/>
           </a:p>
@@ -661,7 +666,7 @@
           <a:p>
             <a:fld id="{FD53FD50-5C23-F345-9B3E-009D52889CFA}" type="datetimeFigureOut">
               <a:rPr kumimoji="1" lang="zh-CN" altLang="en-US" smtClean="0"/>
-              <a:t>2025/10/21</a:t>
+              <a:t>2025/10/22</a:t>
             </a:fld>
             <a:endParaRPr kumimoji="1" lang="zh-CN" altLang="en-US"/>
           </a:p>
@@ -859,7 +864,7 @@
           <a:p>
             <a:fld id="{FD53FD50-5C23-F345-9B3E-009D52889CFA}" type="datetimeFigureOut">
               <a:rPr kumimoji="1" lang="zh-CN" altLang="en-US" smtClean="0"/>
-              <a:t>2025/10/21</a:t>
+              <a:t>2025/10/22</a:t>
             </a:fld>
             <a:endParaRPr kumimoji="1" lang="zh-CN" altLang="en-US"/>
           </a:p>
@@ -1134,7 +1139,7 @@
           <a:p>
             <a:fld id="{FD53FD50-5C23-F345-9B3E-009D52889CFA}" type="datetimeFigureOut">
               <a:rPr kumimoji="1" lang="zh-CN" altLang="en-US" smtClean="0"/>
-              <a:t>2025/10/21</a:t>
+              <a:t>2025/10/22</a:t>
             </a:fld>
             <a:endParaRPr kumimoji="1" lang="zh-CN" altLang="en-US"/>
           </a:p>
@@ -1399,7 +1404,7 @@
           <a:p>
             <a:fld id="{FD53FD50-5C23-F345-9B3E-009D52889CFA}" type="datetimeFigureOut">
               <a:rPr kumimoji="1" lang="zh-CN" altLang="en-US" smtClean="0"/>
-              <a:t>2025/10/21</a:t>
+              <a:t>2025/10/22</a:t>
             </a:fld>
             <a:endParaRPr kumimoji="1" lang="zh-CN" altLang="en-US"/>
           </a:p>
@@ -1811,7 +1816,7 @@
           <a:p>
             <a:fld id="{FD53FD50-5C23-F345-9B3E-009D52889CFA}" type="datetimeFigureOut">
               <a:rPr kumimoji="1" lang="zh-CN" altLang="en-US" smtClean="0"/>
-              <a:t>2025/10/21</a:t>
+              <a:t>2025/10/22</a:t>
             </a:fld>
             <a:endParaRPr kumimoji="1" lang="zh-CN" altLang="en-US"/>
           </a:p>
@@ -1952,7 +1957,7 @@
           <a:p>
             <a:fld id="{FD53FD50-5C23-F345-9B3E-009D52889CFA}" type="datetimeFigureOut">
               <a:rPr kumimoji="1" lang="zh-CN" altLang="en-US" smtClean="0"/>
-              <a:t>2025/10/21</a:t>
+              <a:t>2025/10/22</a:t>
             </a:fld>
             <a:endParaRPr kumimoji="1" lang="zh-CN" altLang="en-US"/>
           </a:p>
@@ -2065,7 +2070,7 @@
           <a:p>
             <a:fld id="{FD53FD50-5C23-F345-9B3E-009D52889CFA}" type="datetimeFigureOut">
               <a:rPr kumimoji="1" lang="zh-CN" altLang="en-US" smtClean="0"/>
-              <a:t>2025/10/21</a:t>
+              <a:t>2025/10/22</a:t>
             </a:fld>
             <a:endParaRPr kumimoji="1" lang="zh-CN" altLang="en-US"/>
           </a:p>
@@ -2376,7 +2381,7 @@
           <a:p>
             <a:fld id="{FD53FD50-5C23-F345-9B3E-009D52889CFA}" type="datetimeFigureOut">
               <a:rPr kumimoji="1" lang="zh-CN" altLang="en-US" smtClean="0"/>
-              <a:t>2025/10/21</a:t>
+              <a:t>2025/10/22</a:t>
             </a:fld>
             <a:endParaRPr kumimoji="1" lang="zh-CN" altLang="en-US"/>
           </a:p>
@@ -2664,7 +2669,7 @@
           <a:p>
             <a:fld id="{FD53FD50-5C23-F345-9B3E-009D52889CFA}" type="datetimeFigureOut">
               <a:rPr kumimoji="1" lang="zh-CN" altLang="en-US" smtClean="0"/>
-              <a:t>2025/10/21</a:t>
+              <a:t>2025/10/22</a:t>
             </a:fld>
             <a:endParaRPr kumimoji="1" lang="zh-CN" altLang="en-US"/>
           </a:p>
@@ -2905,7 +2910,7 @@
           <a:p>
             <a:fld id="{FD53FD50-5C23-F345-9B3E-009D52889CFA}" type="datetimeFigureOut">
               <a:rPr kumimoji="1" lang="zh-CN" altLang="en-US" smtClean="0"/>
-              <a:t>2025/10/21</a:t>
+              <a:t>2025/10/22</a:t>
             </a:fld>
             <a:endParaRPr kumimoji="1" lang="zh-CN" altLang="en-US"/>
           </a:p>
@@ -3704,24 +3709,6 @@
                 <a:ea typeface="DengXian" panose="02010600030101010101" pitchFamily="2" charset="-122"/>
                 <a:cs typeface="Times New Roman" panose="02020603050405020304" pitchFamily="18" charset="0"/>
               </a:rPr>
-              <a:t>左</a:t>
-            </a:r>
-            <a:r>
-              <a:rPr lang="zh-CN" altLang="en-US" sz="1800" kern="100" dirty="0">
-                <a:effectLst/>
-                <a:latin typeface="DengXian" panose="02010600030101010101" pitchFamily="2" charset="-122"/>
-                <a:ea typeface="DengXian" panose="02010600030101010101" pitchFamily="2" charset="-122"/>
-                <a:cs typeface="Times New Roman" panose="02020603050405020304" pitchFamily="18" charset="0"/>
-              </a:rPr>
-              <a:t>箭头 </a:t>
-            </a:r>
-            <a:r>
-              <a:rPr lang="zh-CN" altLang="zh-CN" sz="1800" kern="100" dirty="0">
-                <a:effectLst/>
-                <a:latin typeface="DengXian" panose="02010600030101010101" pitchFamily="2" charset="-122"/>
-                <a:ea typeface="DengXian" panose="02010600030101010101" pitchFamily="2" charset="-122"/>
-                <a:cs typeface="Times New Roman" panose="02020603050405020304" pitchFamily="18" charset="0"/>
-              </a:rPr>
               <a:t>“</a:t>
             </a:r>
             <a:r>
@@ -3731,7 +3718,7 @@
                 <a:ea typeface="DengXian" panose="02010600030101010101" pitchFamily="2" charset="-122"/>
                 <a:cs typeface="Times New Roman" panose="02020603050405020304" pitchFamily="18" charset="0"/>
               </a:rPr>
-              <a:t>←</a:t>
+              <a:t>1</a:t>
             </a:r>
             <a:r>
               <a:rPr lang="zh-CN" altLang="zh-CN" sz="1800" kern="100" dirty="0">
@@ -3794,7 +3781,7 @@
                 <a:ea typeface="DengXian" panose="02010600030101010101" pitchFamily="2" charset="-122"/>
                 <a:cs typeface="Times New Roman" panose="02020603050405020304" pitchFamily="18" charset="0"/>
               </a:rPr>
-              <a:t>，下箭头</a:t>
+              <a:t>，</a:t>
             </a:r>
             <a:r>
               <a:rPr lang="en-US" altLang="zh-CN" sz="1800" kern="100" dirty="0">
@@ -3803,7 +3790,7 @@
                 <a:ea typeface="DengXian" panose="02010600030101010101" pitchFamily="2" charset="-122"/>
                 <a:cs typeface="Times New Roman" panose="02020603050405020304" pitchFamily="18" charset="0"/>
               </a:rPr>
-              <a:t>"↓"</a:t>
+              <a:t>”2"</a:t>
             </a:r>
             <a:r>
               <a:rPr lang="zh-CN" altLang="zh-CN" sz="1800" kern="100" dirty="0">
@@ -3812,7 +3799,7 @@
                 <a:ea typeface="DengXian" panose="02010600030101010101" pitchFamily="2" charset="-122"/>
                 <a:cs typeface="Times New Roman" panose="02020603050405020304" pitchFamily="18" charset="0"/>
               </a:rPr>
-              <a:t>表示“有点确定”，右箭头</a:t>
+              <a:t>表示“有点确定”，</a:t>
             </a:r>
             <a:r>
               <a:rPr lang="en-US" altLang="zh-CN" sz="1800" kern="100" dirty="0">
@@ -3821,7 +3808,7 @@
                 <a:ea typeface="DengXian" panose="02010600030101010101" pitchFamily="2" charset="-122"/>
                 <a:cs typeface="Times New Roman" panose="02020603050405020304" pitchFamily="18" charset="0"/>
               </a:rPr>
-              <a:t>"→"</a:t>
+              <a:t>”3"</a:t>
             </a:r>
             <a:r>
               <a:rPr lang="zh-CN" altLang="zh-CN" sz="1800" kern="100" dirty="0">
@@ -3895,6 +3882,315 @@
           </a:prstGeom>
         </p:spPr>
       </p:pic>
+      <p:pic>
+        <p:nvPicPr>
+          <p:cNvPr id="9" name="图片 8">
+            <a:extLst>
+              <a:ext uri="{FF2B5EF4-FFF2-40B4-BE49-F238E27FC236}">
+                <a16:creationId xmlns:a16="http://schemas.microsoft.com/office/drawing/2014/main" id="{5DBEE6B0-8EA9-D601-33CE-86F85980522D}"/>
+              </a:ext>
+            </a:extLst>
+          </p:cNvPr>
+          <p:cNvPicPr>
+            <a:picLocks noChangeAspect="1"/>
+          </p:cNvPicPr>
+          <p:nvPr/>
+        </p:nvPicPr>
+        <p:blipFill>
+          <a:blip r:embed="rId4"/>
+          <a:stretch>
+            <a:fillRect/>
+          </a:stretch>
+        </p:blipFill>
+        <p:spPr>
+          <a:xfrm>
+            <a:off x="7404417" y="5859780"/>
+            <a:ext cx="406400" cy="419100"/>
+          </a:xfrm>
+          <a:prstGeom prst="rect">
+            <a:avLst/>
+          </a:prstGeom>
+        </p:spPr>
+      </p:pic>
+      <p:pic>
+        <p:nvPicPr>
+          <p:cNvPr id="10" name="图片 9">
+            <a:extLst>
+              <a:ext uri="{FF2B5EF4-FFF2-40B4-BE49-F238E27FC236}">
+                <a16:creationId xmlns:a16="http://schemas.microsoft.com/office/drawing/2014/main" id="{F01527B5-FCDF-88EB-DEBA-EEF040C40366}"/>
+              </a:ext>
+            </a:extLst>
+          </p:cNvPr>
+          <p:cNvPicPr>
+            <a:picLocks noChangeAspect="1"/>
+          </p:cNvPicPr>
+          <p:nvPr/>
+        </p:nvPicPr>
+        <p:blipFill>
+          <a:blip r:embed="rId4"/>
+          <a:stretch>
+            <a:fillRect/>
+          </a:stretch>
+        </p:blipFill>
+        <p:spPr>
+          <a:xfrm>
+            <a:off x="8668067" y="5859780"/>
+            <a:ext cx="406400" cy="419100"/>
+          </a:xfrm>
+          <a:prstGeom prst="rect">
+            <a:avLst/>
+          </a:prstGeom>
+        </p:spPr>
+      </p:pic>
+      <p:pic>
+        <p:nvPicPr>
+          <p:cNvPr id="11" name="图片 10">
+            <a:extLst>
+              <a:ext uri="{FF2B5EF4-FFF2-40B4-BE49-F238E27FC236}">
+                <a16:creationId xmlns:a16="http://schemas.microsoft.com/office/drawing/2014/main" id="{E4219D02-68F0-783F-3574-0DED4CCC1F22}"/>
+              </a:ext>
+            </a:extLst>
+          </p:cNvPr>
+          <p:cNvPicPr>
+            <a:picLocks noChangeAspect="1"/>
+          </p:cNvPicPr>
+          <p:nvPr/>
+        </p:nvPicPr>
+        <p:blipFill>
+          <a:blip r:embed="rId4"/>
+          <a:stretch>
+            <a:fillRect/>
+          </a:stretch>
+        </p:blipFill>
+        <p:spPr>
+          <a:xfrm>
+            <a:off x="10120153" y="5859780"/>
+            <a:ext cx="406400" cy="419100"/>
+          </a:xfrm>
+          <a:prstGeom prst="rect">
+            <a:avLst/>
+          </a:prstGeom>
+        </p:spPr>
+      </p:pic>
+      <p:sp>
+        <p:nvSpPr>
+          <p:cNvPr id="6" name="文本框 1">
+            <a:extLst>
+              <a:ext uri="{FF2B5EF4-FFF2-40B4-BE49-F238E27FC236}">
+                <a16:creationId xmlns:a16="http://schemas.microsoft.com/office/drawing/2014/main" id="{3AD7DACF-A22E-CF6F-D905-AF9A44E53B50}"/>
+              </a:ext>
+            </a:extLst>
+          </p:cNvPr>
+          <p:cNvSpPr txBox="1"/>
+          <p:nvPr/>
+        </p:nvSpPr>
+        <p:spPr>
+          <a:xfrm>
+            <a:off x="7404417" y="5823585"/>
+            <a:ext cx="342900" cy="454025"/>
+          </a:xfrm>
+          <a:prstGeom prst="rect">
+            <a:avLst/>
+          </a:prstGeom>
+          <a:noFill/>
+          <a:ln>
+            <a:noFill/>
+          </a:ln>
+        </p:spPr>
+        <p:txBody>
+          <a:bodyPr rot="0" spcFirstLastPara="0" vert="horz" wrap="square" lIns="91440" tIns="45720" rIns="91440" bIns="45720" numCol="1" spcCol="0" rtlCol="0" fromWordArt="0" anchor="t" anchorCtr="0" forceAA="0" compatLnSpc="1">
+            <a:prstTxWarp prst="textNoShape">
+              <a:avLst/>
+            </a:prstTxWarp>
+            <a:noAutofit/>
+          </a:bodyPr>
+          <a:lstStyle/>
+          <a:p>
+            <a:pPr>
+              <a:lnSpc>
+                <a:spcPct val="115000"/>
+              </a:lnSpc>
+              <a:spcAft>
+                <a:spcPts val="800"/>
+              </a:spcAft>
+              <a:buNone/>
+            </a:pPr>
+            <a:r>
+              <a:rPr lang="en-US" sz="2200" b="1" kern="100" spc="50" dirty="0">
+                <a:ln>
+                  <a:noFill/>
+                </a:ln>
+                <a:solidFill>
+                  <a:srgbClr val="FFFFFF"/>
+                </a:solidFill>
+                <a:effectLst>
+                  <a:outerShdw blurRad="63500" dist="50800" dir="13500000" sx="0" sy="0">
+                    <a:srgbClr val="000000">
+                      <a:alpha val="50000"/>
+                    </a:srgbClr>
+                  </a:outerShdw>
+                </a:effectLst>
+                <a:latin typeface="DengXian" panose="02010600030101010101" pitchFamily="2" charset="-122"/>
+                <a:ea typeface="DengXian" panose="02010600030101010101" pitchFamily="2" charset="-122"/>
+                <a:cs typeface="Times New Roman" panose="02020603050405020304" pitchFamily="18" charset="0"/>
+              </a:rPr>
+              <a:t>1 </a:t>
+            </a:r>
+            <a:endParaRPr lang="zh-CN" sz="1100" kern="100" dirty="0">
+              <a:effectLst/>
+              <a:latin typeface="DengXian" panose="02010600030101010101" pitchFamily="2" charset="-122"/>
+              <a:ea typeface="DengXian" panose="02010600030101010101" pitchFamily="2" charset="-122"/>
+              <a:cs typeface="Times New Roman" panose="02020603050405020304" pitchFamily="18" charset="0"/>
+            </a:endParaRPr>
+          </a:p>
+        </p:txBody>
+      </p:sp>
+      <p:sp>
+        <p:nvSpPr>
+          <p:cNvPr id="7" name="文本框 1">
+            <a:extLst>
+              <a:ext uri="{FF2B5EF4-FFF2-40B4-BE49-F238E27FC236}">
+                <a16:creationId xmlns:a16="http://schemas.microsoft.com/office/drawing/2014/main" id="{5B8A1368-B965-B2E2-C148-3AF701D974D9}"/>
+              </a:ext>
+            </a:extLst>
+          </p:cNvPr>
+          <p:cNvSpPr txBox="1"/>
+          <p:nvPr/>
+        </p:nvSpPr>
+        <p:spPr>
+          <a:xfrm>
+            <a:off x="8789987" y="5815965"/>
+            <a:ext cx="342900" cy="454025"/>
+          </a:xfrm>
+          <a:prstGeom prst="rect">
+            <a:avLst/>
+          </a:prstGeom>
+          <a:noFill/>
+          <a:ln>
+            <a:noFill/>
+          </a:ln>
+        </p:spPr>
+        <p:txBody>
+          <a:bodyPr rot="0" spcFirstLastPara="0" vert="horz" wrap="square" lIns="91440" tIns="45720" rIns="91440" bIns="45720" numCol="1" spcCol="0" rtlCol="0" fromWordArt="0" anchor="t" anchorCtr="0" forceAA="0" compatLnSpc="1">
+            <a:prstTxWarp prst="textNoShape">
+              <a:avLst/>
+            </a:prstTxWarp>
+            <a:noAutofit/>
+          </a:bodyPr>
+          <a:lstStyle/>
+          <a:p>
+            <a:pPr algn="ctr">
+              <a:lnSpc>
+                <a:spcPct val="115000"/>
+              </a:lnSpc>
+              <a:spcAft>
+                <a:spcPts val="800"/>
+              </a:spcAft>
+              <a:buNone/>
+            </a:pPr>
+            <a:r>
+              <a:rPr lang="en-US" sz="2200" b="1" kern="100" spc="50" dirty="0">
+                <a:ln>
+                  <a:noFill/>
+                </a:ln>
+                <a:solidFill>
+                  <a:srgbClr val="FFFFFF"/>
+                </a:solidFill>
+                <a:effectLst>
+                  <a:outerShdw blurRad="63500" dist="50800" dir="13500000" sx="0" sy="0">
+                    <a:srgbClr val="000000">
+                      <a:alpha val="50000"/>
+                    </a:srgbClr>
+                  </a:outerShdw>
+                </a:effectLst>
+                <a:latin typeface="DengXian" panose="02010600030101010101" pitchFamily="2" charset="-122"/>
+                <a:ea typeface="DengXian" panose="02010600030101010101" pitchFamily="2" charset="-122"/>
+                <a:cs typeface="Times New Roman" panose="02020603050405020304" pitchFamily="18" charset="0"/>
+              </a:rPr>
+              <a:t>2 </a:t>
+            </a:r>
+            <a:endParaRPr lang="zh-CN" sz="1100" kern="100" dirty="0">
+              <a:effectLst/>
+              <a:latin typeface="DengXian" panose="02010600030101010101" pitchFamily="2" charset="-122"/>
+              <a:ea typeface="DengXian" panose="02010600030101010101" pitchFamily="2" charset="-122"/>
+              <a:cs typeface="Times New Roman" panose="02020603050405020304" pitchFamily="18" charset="0"/>
+            </a:endParaRPr>
+          </a:p>
+        </p:txBody>
+      </p:sp>
+      <p:sp>
+        <p:nvSpPr>
+          <p:cNvPr id="8" name="文本框 1">
+            <a:extLst>
+              <a:ext uri="{FF2B5EF4-FFF2-40B4-BE49-F238E27FC236}">
+                <a16:creationId xmlns:a16="http://schemas.microsoft.com/office/drawing/2014/main" id="{95C7CBE6-7EF8-46B1-2D29-941EDD654F98}"/>
+              </a:ext>
+            </a:extLst>
+          </p:cNvPr>
+          <p:cNvSpPr txBox="1"/>
+          <p:nvPr/>
+        </p:nvSpPr>
+        <p:spPr>
+          <a:xfrm>
+            <a:off x="10171112" y="5824855"/>
+            <a:ext cx="342900" cy="454025"/>
+          </a:xfrm>
+          <a:prstGeom prst="rect">
+            <a:avLst/>
+          </a:prstGeom>
+          <a:noFill/>
+          <a:ln>
+            <a:noFill/>
+          </a:ln>
+        </p:spPr>
+        <p:txBody>
+          <a:bodyPr rot="0" spcFirstLastPara="0" vert="horz" wrap="square" lIns="91440" tIns="45720" rIns="91440" bIns="45720" numCol="1" spcCol="0" rtlCol="0" fromWordArt="0" anchor="t" anchorCtr="0" forceAA="0" compatLnSpc="1">
+            <a:prstTxWarp prst="textNoShape">
+              <a:avLst/>
+            </a:prstTxWarp>
+            <a:noAutofit/>
+          </a:bodyPr>
+          <a:lstStyle/>
+          <a:p>
+            <a:pPr algn="ctr">
+              <a:lnSpc>
+                <a:spcPct val="115000"/>
+              </a:lnSpc>
+              <a:spcAft>
+                <a:spcPts val="800"/>
+              </a:spcAft>
+              <a:buNone/>
+            </a:pPr>
+            <a:r>
+              <a:rPr lang="en-US" sz="2200" b="1" kern="100" spc="50" dirty="0">
+                <a:ln>
+                  <a:noFill/>
+                </a:ln>
+                <a:solidFill>
+                  <a:srgbClr val="FFFFFF"/>
+                </a:solidFill>
+                <a:effectLst>
+                  <a:outerShdw blurRad="63500" dist="50800" dir="13500000" sx="0" sy="0">
+                    <a:srgbClr val="000000">
+                      <a:alpha val="50000"/>
+                    </a:srgbClr>
+                  </a:outerShdw>
+                </a:effectLst>
+                <a:latin typeface="DengXian" panose="02010600030101010101" pitchFamily="2" charset="-122"/>
+                <a:ea typeface="DengXian" panose="02010600030101010101" pitchFamily="2" charset="-122"/>
+                <a:cs typeface="Times New Roman" panose="02020603050405020304" pitchFamily="18" charset="0"/>
+              </a:rPr>
+              <a:t>3  </a:t>
+            </a:r>
+            <a:endParaRPr lang="zh-CN" sz="1100" kern="100" dirty="0">
+              <a:effectLst/>
+              <a:latin typeface="DengXian" panose="02010600030101010101" pitchFamily="2" charset="-122"/>
+              <a:ea typeface="DengXian" panose="02010600030101010101" pitchFamily="2" charset="-122"/>
+              <a:cs typeface="Times New Roman" panose="02020603050405020304" pitchFamily="18" charset="0"/>
+            </a:endParaRPr>
+          </a:p>
+        </p:txBody>
+      </p:sp>
     </p:spTree>
     <p:extLst>
       <p:ext uri="{BB962C8B-B14F-4D97-AF65-F5344CB8AC3E}">

</xml_diff>